<commit_message>
Uploading Solutions see ML_Workshop_2.ipynb
</commit_message>
<xml_diff>
--- a/Slides-W2.pptx
+++ b/Slides-W2.pptx
@@ -5,7 +5,7 @@
     <p:sldMasterId id="2147483660" r:id="rId1"/>
   </p:sldMasterIdLst>
   <p:notesMasterIdLst>
-    <p:notesMasterId r:id="rId20"/>
+    <p:notesMasterId r:id="rId21"/>
   </p:notesMasterIdLst>
   <p:sldIdLst>
     <p:sldId id="256" r:id="rId2"/>
@@ -26,6 +26,7 @@
     <p:sldId id="270" r:id="rId17"/>
     <p:sldId id="271" r:id="rId18"/>
     <p:sldId id="273" r:id="rId19"/>
+    <p:sldId id="274" r:id="rId20"/>
   </p:sldIdLst>
   <p:sldSz cx="12192000" cy="6858000"/>
   <p:notesSz cx="6858000" cy="9144000"/>
@@ -8953,7 +8954,10 @@
           <a:bodyPr/>
           <a:lstStyle/>
           <a:p>
-            <a:endParaRPr lang="en-US"/>
+            <a:r>
+              <a:rPr lang="en-US" dirty="0"/>
+              <a:t>MNIST Dataset</a:t>
+            </a:r>
           </a:p>
         </p:txBody>
       </p:sp>
@@ -8973,19 +8977,234 @@
             <p:ph idx="1"/>
           </p:nvPr>
         </p:nvSpPr>
-        <p:spPr/>
+        <p:spPr>
+          <a:xfrm>
+            <a:off x="609600" y="1557867"/>
+            <a:ext cx="11197021" cy="1871133"/>
+          </a:xfrm>
+        </p:spPr>
         <p:txBody>
           <a:bodyPr/>
           <a:lstStyle/>
           <a:p>
-            <a:endParaRPr lang="en-US"/>
-          </a:p>
-        </p:txBody>
-      </p:sp>
+            <a:r>
+              <a:rPr lang="en-US" dirty="0"/>
+              <a:t>Standard test dataset for handwriting digit recognition and OCR</a:t>
+            </a:r>
+          </a:p>
+          <a:p>
+            <a:r>
+              <a:rPr lang="en-US" dirty="0"/>
+              <a:t>Images are pretty small (28x28) and cleaned-up (black and white)</a:t>
+            </a:r>
+          </a:p>
+        </p:txBody>
+      </p:sp>
+      <p:pic>
+        <p:nvPicPr>
+          <p:cNvPr id="11266" name="Picture 2" descr="Top 10 Popular Publicly Available Datasets For Deep Learning Research">
+            <a:extLst>
+              <a:ext uri="{FF2B5EF4-FFF2-40B4-BE49-F238E27FC236}">
+                <a16:creationId xmlns:a16="http://schemas.microsoft.com/office/drawing/2014/main" id="{8C05CA68-D36D-664A-F9FA-A852131527E4}"/>
+              </a:ext>
+            </a:extLst>
+          </p:cNvPr>
+          <p:cNvPicPr>
+            <a:picLocks noChangeAspect="1" noChangeArrowheads="1"/>
+          </p:cNvPicPr>
+          <p:nvPr/>
+        </p:nvPicPr>
+        <p:blipFill>
+          <a:blip r:embed="rId2">
+            <a:extLst>
+              <a:ext uri="{28A0092B-C50C-407E-A947-70E740481C1C}">
+                <a14:useLocalDpi xmlns:a14="http://schemas.microsoft.com/office/drawing/2010/main" val="0"/>
+              </a:ext>
+            </a:extLst>
+          </a:blip>
+          <a:srcRect/>
+          <a:stretch>
+            <a:fillRect/>
+          </a:stretch>
+        </p:blipFill>
+        <p:spPr bwMode="auto">
+          <a:xfrm>
+            <a:off x="4779335" y="2707315"/>
+            <a:ext cx="5403112" cy="4052334"/>
+          </a:xfrm>
+          <a:prstGeom prst="rect">
+            <a:avLst/>
+          </a:prstGeom>
+          <a:noFill/>
+          <a:extLst>
+            <a:ext uri="{909E8E84-426E-40DD-AFC4-6F175D3DCCD1}">
+              <a14:hiddenFill xmlns:a14="http://schemas.microsoft.com/office/drawing/2010/main">
+                <a:solidFill>
+                  <a:srgbClr val="FFFFFF"/>
+                </a:solidFill>
+              </a14:hiddenFill>
+            </a:ext>
+          </a:extLst>
+        </p:spPr>
+      </p:pic>
     </p:spTree>
     <p:extLst>
       <p:ext uri="{BB962C8B-B14F-4D97-AF65-F5344CB8AC3E}">
         <p14:creationId xmlns:p14="http://schemas.microsoft.com/office/powerpoint/2010/main" val="176349860"/>
+      </p:ext>
+    </p:extLst>
+  </p:cSld>
+  <p:clrMapOvr>
+    <a:masterClrMapping/>
+  </p:clrMapOvr>
+</p:sld>
+</file>
+
+<file path=ppt/slides/slide19.xml><?xml version="1.0" encoding="utf-8"?>
+<p:sld xmlns:a="http://schemas.openxmlformats.org/drawingml/2006/main" xmlns:r="http://schemas.openxmlformats.org/officeDocument/2006/relationships" xmlns:p="http://schemas.openxmlformats.org/presentationml/2006/main">
+  <p:cSld>
+    <p:spTree>
+      <p:nvGrpSpPr>
+        <p:cNvPr id="1" name=""/>
+        <p:cNvGrpSpPr/>
+        <p:nvPr/>
+      </p:nvGrpSpPr>
+      <p:grpSpPr>
+        <a:xfrm>
+          <a:off x="0" y="0"/>
+          <a:ext cx="0" cy="0"/>
+          <a:chOff x="0" y="0"/>
+          <a:chExt cx="0" cy="0"/>
+        </a:xfrm>
+      </p:grpSpPr>
+      <p:sp>
+        <p:nvSpPr>
+          <p:cNvPr id="2" name="Title 1">
+            <a:extLst>
+              <a:ext uri="{FF2B5EF4-FFF2-40B4-BE49-F238E27FC236}">
+                <a16:creationId xmlns:a16="http://schemas.microsoft.com/office/drawing/2014/main" id="{1D915762-C805-1332-5254-0E03F862776D}"/>
+              </a:ext>
+            </a:extLst>
+          </p:cNvPr>
+          <p:cNvSpPr>
+            <a:spLocks noGrp="1"/>
+          </p:cNvSpPr>
+          <p:nvPr>
+            <p:ph type="title"/>
+          </p:nvPr>
+        </p:nvSpPr>
+        <p:spPr>
+          <a:xfrm>
+            <a:off x="609600" y="280288"/>
+            <a:ext cx="11197021" cy="1094813"/>
+          </a:xfrm>
+        </p:spPr>
+        <p:txBody>
+          <a:bodyPr anchor="b">
+            <a:normAutofit/>
+          </a:bodyPr>
+          <a:lstStyle/>
+          <a:p>
+            <a:r>
+              <a:rPr lang="en-US" dirty="0"/>
+              <a:t>Recurrent Neural Networks</a:t>
+            </a:r>
+          </a:p>
+        </p:txBody>
+      </p:sp>
+      <p:sp>
+        <p:nvSpPr>
+          <p:cNvPr id="3" name="Content Placeholder 2">
+            <a:extLst>
+              <a:ext uri="{FF2B5EF4-FFF2-40B4-BE49-F238E27FC236}">
+                <a16:creationId xmlns:a16="http://schemas.microsoft.com/office/drawing/2014/main" id="{7C00E5DA-9A37-3A96-B328-1DD4661F0C31}"/>
+              </a:ext>
+            </a:extLst>
+          </p:cNvPr>
+          <p:cNvSpPr>
+            <a:spLocks noGrp="1"/>
+          </p:cNvSpPr>
+          <p:nvPr>
+            <p:ph idx="1"/>
+          </p:nvPr>
+        </p:nvSpPr>
+        <p:spPr>
+          <a:xfrm>
+            <a:off x="609602" y="1512711"/>
+            <a:ext cx="5322905" cy="4538133"/>
+          </a:xfrm>
+        </p:spPr>
+        <p:txBody>
+          <a:bodyPr>
+            <a:normAutofit/>
+          </a:bodyPr>
+          <a:lstStyle/>
+          <a:p>
+            <a:r>
+              <a:rPr lang="en-US" dirty="0"/>
+              <a:t>RNN are better suited for time series prediction since the structure accepts past states</a:t>
+            </a:r>
+          </a:p>
+          <a:p>
+            <a:r>
+              <a:rPr lang="en-US" dirty="0"/>
+              <a:t>Often used for weather prediction, signal analysis, speech recognition, etc.</a:t>
+            </a:r>
+          </a:p>
+        </p:txBody>
+      </p:sp>
+      <p:pic>
+        <p:nvPicPr>
+          <p:cNvPr id="12290" name="Picture 2">
+            <a:extLst>
+              <a:ext uri="{FF2B5EF4-FFF2-40B4-BE49-F238E27FC236}">
+                <a16:creationId xmlns:a16="http://schemas.microsoft.com/office/drawing/2014/main" id="{D6D03EED-9F40-6DA8-8F70-B441A7FB85A2}"/>
+              </a:ext>
+            </a:extLst>
+          </p:cNvPr>
+          <p:cNvPicPr>
+            <a:picLocks noChangeAspect="1" noChangeArrowheads="1"/>
+          </p:cNvPicPr>
+          <p:nvPr/>
+        </p:nvPicPr>
+        <p:blipFill>
+          <a:blip r:embed="rId2">
+            <a:extLst>
+              <a:ext uri="{28A0092B-C50C-407E-A947-70E740481C1C}">
+                <a14:useLocalDpi xmlns:a14="http://schemas.microsoft.com/office/drawing/2010/main" val="0"/>
+              </a:ext>
+            </a:extLst>
+          </a:blip>
+          <a:stretch>
+            <a:fillRect/>
+          </a:stretch>
+        </p:blipFill>
+        <p:spPr bwMode="auto">
+          <a:xfrm>
+            <a:off x="6259497" y="2164945"/>
+            <a:ext cx="5322905" cy="3233664"/>
+          </a:xfrm>
+          <a:prstGeom prst="rect">
+            <a:avLst/>
+          </a:prstGeom>
+          <a:solidFill>
+            <a:srgbClr val="FFFFFF"/>
+          </a:solidFill>
+          <a:extLst>
+            <a:ext uri="{909E8E84-426E-40DD-AFC4-6F175D3DCCD1}">
+              <a14:hiddenFill xmlns:a14="http://schemas.microsoft.com/office/drawing/2010/main">
+                <a:solidFill>
+                  <a:srgbClr val="FFFFFF"/>
+                </a:solidFill>
+              </a14:hiddenFill>
+            </a:ext>
+          </a:extLst>
+        </p:spPr>
+      </p:pic>
+    </p:spTree>
+    <p:extLst>
+      <p:ext uri="{BB962C8B-B14F-4D97-AF65-F5344CB8AC3E}">
+        <p14:creationId xmlns:p14="http://schemas.microsoft.com/office/powerpoint/2010/main" val="1024419662"/>
       </p:ext>
     </p:extLst>
   </p:cSld>

</xml_diff>